<commit_message>
skill-effect 1차 완 / skill table 시작 (category 데이터를 skill info에서 skill 로 이동)
</commit_message>
<xml_diff>
--- a/로스트아크/데이터테이블/테이블이미지.pptx
+++ b/로스트아크/데이터테이블/테이블이미지.pptx
@@ -6,6 +6,7 @@
   </p:sldMasterIdLst>
   <p:sldIdLst>
     <p:sldId id="256" r:id="rId2"/>
+    <p:sldId id="257" r:id="rId3"/>
   </p:sldIdLst>
   <p:sldSz cx="12192000" cy="6858000"/>
   <p:notesSz cx="6858000" cy="9144000"/>
@@ -104,6 +105,11 @@
       </a:defRPr>
     </a:lvl9pPr>
   </p:defaultTextStyle>
+  <p:extLst>
+    <p:ext uri="{EFAFB233-063F-42B5-8137-9DF3F51BA10A}">
+      <p15:sldGuideLst xmlns:p15="http://schemas.microsoft.com/office/powerpoint/2012/main"/>
+    </p:ext>
+  </p:extLst>
 </p:presentation>
 </file>
 
@@ -254,7 +260,7 @@
           <a:p>
             <a:fld id="{2D95754B-E4E7-44CF-B48B-260DA73523A2}" type="datetimeFigureOut">
               <a:rPr lang="ko-KR" altLang="en-US" smtClean="0"/>
-              <a:t>2024-08-24</a:t>
+              <a:t>2025-05-07</a:t>
             </a:fld>
             <a:endParaRPr lang="ko-KR" altLang="en-US"/>
           </a:p>
@@ -452,7 +458,7 @@
           <a:p>
             <a:fld id="{2D95754B-E4E7-44CF-B48B-260DA73523A2}" type="datetimeFigureOut">
               <a:rPr lang="ko-KR" altLang="en-US" smtClean="0"/>
-              <a:t>2024-08-24</a:t>
+              <a:t>2025-05-07</a:t>
             </a:fld>
             <a:endParaRPr lang="ko-KR" altLang="en-US"/>
           </a:p>
@@ -660,7 +666,7 @@
           <a:p>
             <a:fld id="{2D95754B-E4E7-44CF-B48B-260DA73523A2}" type="datetimeFigureOut">
               <a:rPr lang="ko-KR" altLang="en-US" smtClean="0"/>
-              <a:t>2024-08-24</a:t>
+              <a:t>2025-05-07</a:t>
             </a:fld>
             <a:endParaRPr lang="ko-KR" altLang="en-US"/>
           </a:p>
@@ -858,7 +864,7 @@
           <a:p>
             <a:fld id="{2D95754B-E4E7-44CF-B48B-260DA73523A2}" type="datetimeFigureOut">
               <a:rPr lang="ko-KR" altLang="en-US" smtClean="0"/>
-              <a:t>2024-08-24</a:t>
+              <a:t>2025-05-07</a:t>
             </a:fld>
             <a:endParaRPr lang="ko-KR" altLang="en-US"/>
           </a:p>
@@ -1133,7 +1139,7 @@
           <a:p>
             <a:fld id="{2D95754B-E4E7-44CF-B48B-260DA73523A2}" type="datetimeFigureOut">
               <a:rPr lang="ko-KR" altLang="en-US" smtClean="0"/>
-              <a:t>2024-08-24</a:t>
+              <a:t>2025-05-07</a:t>
             </a:fld>
             <a:endParaRPr lang="ko-KR" altLang="en-US"/>
           </a:p>
@@ -1398,7 +1404,7 @@
           <a:p>
             <a:fld id="{2D95754B-E4E7-44CF-B48B-260DA73523A2}" type="datetimeFigureOut">
               <a:rPr lang="ko-KR" altLang="en-US" smtClean="0"/>
-              <a:t>2024-08-24</a:t>
+              <a:t>2025-05-07</a:t>
             </a:fld>
             <a:endParaRPr lang="ko-KR" altLang="en-US"/>
           </a:p>
@@ -1810,7 +1816,7 @@
           <a:p>
             <a:fld id="{2D95754B-E4E7-44CF-B48B-260DA73523A2}" type="datetimeFigureOut">
               <a:rPr lang="ko-KR" altLang="en-US" smtClean="0"/>
-              <a:t>2024-08-24</a:t>
+              <a:t>2025-05-07</a:t>
             </a:fld>
             <a:endParaRPr lang="ko-KR" altLang="en-US"/>
           </a:p>
@@ -1951,7 +1957,7 @@
           <a:p>
             <a:fld id="{2D95754B-E4E7-44CF-B48B-260DA73523A2}" type="datetimeFigureOut">
               <a:rPr lang="ko-KR" altLang="en-US" smtClean="0"/>
-              <a:t>2024-08-24</a:t>
+              <a:t>2025-05-07</a:t>
             </a:fld>
             <a:endParaRPr lang="ko-KR" altLang="en-US"/>
           </a:p>
@@ -2064,7 +2070,7 @@
           <a:p>
             <a:fld id="{2D95754B-E4E7-44CF-B48B-260DA73523A2}" type="datetimeFigureOut">
               <a:rPr lang="ko-KR" altLang="en-US" smtClean="0"/>
-              <a:t>2024-08-24</a:t>
+              <a:t>2025-05-07</a:t>
             </a:fld>
             <a:endParaRPr lang="ko-KR" altLang="en-US"/>
           </a:p>
@@ -2375,7 +2381,7 @@
           <a:p>
             <a:fld id="{2D95754B-E4E7-44CF-B48B-260DA73523A2}" type="datetimeFigureOut">
               <a:rPr lang="ko-KR" altLang="en-US" smtClean="0"/>
-              <a:t>2024-08-24</a:t>
+              <a:t>2025-05-07</a:t>
             </a:fld>
             <a:endParaRPr lang="ko-KR" altLang="en-US"/>
           </a:p>
@@ -2663,7 +2669,7 @@
           <a:p>
             <a:fld id="{2D95754B-E4E7-44CF-B48B-260DA73523A2}" type="datetimeFigureOut">
               <a:rPr lang="ko-KR" altLang="en-US" smtClean="0"/>
-              <a:t>2024-08-24</a:t>
+              <a:t>2025-05-07</a:t>
             </a:fld>
             <a:endParaRPr lang="ko-KR" altLang="en-US"/>
           </a:p>
@@ -2904,7 +2910,7 @@
           <a:p>
             <a:fld id="{2D95754B-E4E7-44CF-B48B-260DA73523A2}" type="datetimeFigureOut">
               <a:rPr lang="ko-KR" altLang="en-US" smtClean="0"/>
-              <a:t>2024-08-24</a:t>
+              <a:t>2025-05-07</a:t>
             </a:fld>
             <a:endParaRPr lang="ko-KR" altLang="en-US"/>
           </a:p>
@@ -4718,6 +4724,1068 @@
 </p:sld>
 </file>
 
+<file path=ppt/slides/slide2.xml><?xml version="1.0" encoding="utf-8"?>
+<p:sld xmlns:a="http://schemas.openxmlformats.org/drawingml/2006/main" xmlns:r="http://schemas.openxmlformats.org/officeDocument/2006/relationships" xmlns:p="http://schemas.openxmlformats.org/presentationml/2006/main">
+  <p:cSld>
+    <p:spTree>
+      <p:nvGrpSpPr>
+        <p:cNvPr id="1" name=""/>
+        <p:cNvGrpSpPr/>
+        <p:nvPr/>
+      </p:nvGrpSpPr>
+      <p:grpSpPr>
+        <a:xfrm>
+          <a:off x="0" y="0"/>
+          <a:ext cx="0" cy="0"/>
+          <a:chOff x="0" y="0"/>
+          <a:chExt cx="0" cy="0"/>
+        </a:xfrm>
+      </p:grpSpPr>
+      <p:grpSp>
+        <p:nvGrpSpPr>
+          <p:cNvPr id="11" name="그룹 10">
+            <a:extLst>
+              <a:ext uri="{FF2B5EF4-FFF2-40B4-BE49-F238E27FC236}">
+                <a16:creationId xmlns:a16="http://schemas.microsoft.com/office/drawing/2014/main" id="{ED7B6967-EB3E-7CC9-105B-54D2C245D017}"/>
+              </a:ext>
+            </a:extLst>
+          </p:cNvPr>
+          <p:cNvGrpSpPr/>
+          <p:nvPr/>
+        </p:nvGrpSpPr>
+        <p:grpSpPr>
+          <a:xfrm>
+            <a:off x="1454948" y="1845504"/>
+            <a:ext cx="4641052" cy="1996052"/>
+            <a:chOff x="2177728" y="2157028"/>
+            <a:chExt cx="4641052" cy="1996052"/>
+          </a:xfrm>
+        </p:grpSpPr>
+        <p:sp>
+          <p:nvSpPr>
+            <p:cNvPr id="5" name="TextBox 1">
+              <a:extLst>
+                <a:ext uri="{FF2B5EF4-FFF2-40B4-BE49-F238E27FC236}">
+                  <a16:creationId xmlns:a16="http://schemas.microsoft.com/office/drawing/2014/main" id="{9A529E90-76D9-BE2E-83ED-9F073FE9F5F9}"/>
+                </a:ext>
+              </a:extLst>
+            </p:cNvPr>
+            <p:cNvSpPr txBox="1"/>
+            <p:nvPr/>
+          </p:nvSpPr>
+          <p:spPr>
+            <a:xfrm>
+              <a:off x="2177731" y="2462149"/>
+              <a:ext cx="4641048" cy="844931"/>
+            </a:xfrm>
+            <a:prstGeom prst="rect">
+              <a:avLst/>
+            </a:prstGeom>
+            <a:solidFill>
+              <a:schemeClr val="bg1"/>
+            </a:solidFill>
+            <a:ln w="12700">
+              <a:solidFill>
+                <a:schemeClr val="tx1"/>
+              </a:solidFill>
+            </a:ln>
+          </p:spPr>
+          <p:style>
+            <a:lnRef idx="0">
+              <a:scrgbClr r="0" g="0" b="0"/>
+            </a:lnRef>
+            <a:fillRef idx="0">
+              <a:scrgbClr r="0" g="0" b="0"/>
+            </a:fillRef>
+            <a:effectRef idx="0">
+              <a:scrgbClr r="0" g="0" b="0"/>
+            </a:effectRef>
+            <a:fontRef idx="minor">
+              <a:schemeClr val="tx1"/>
+            </a:fontRef>
+          </p:style>
+          <p:txBody>
+            <a:bodyPr wrap="square" lIns="216000" rtlCol="0" anchor="ctr">
+              <a:noAutofit/>
+            </a:bodyPr>
+            <a:lstStyle>
+              <a:lvl1pPr marL="0" indent="0">
+                <a:defRPr sz="1100">
+                  <a:solidFill>
+                    <a:schemeClr val="tx1"/>
+                  </a:solidFill>
+                  <a:latin typeface="+mn-lt"/>
+                  <a:ea typeface="+mn-ea"/>
+                  <a:cs typeface="+mn-cs"/>
+                </a:defRPr>
+              </a:lvl1pPr>
+              <a:lvl2pPr marL="457200" indent="0">
+                <a:defRPr sz="1100">
+                  <a:solidFill>
+                    <a:schemeClr val="tx1"/>
+                  </a:solidFill>
+                  <a:latin typeface="+mn-lt"/>
+                  <a:ea typeface="+mn-ea"/>
+                  <a:cs typeface="+mn-cs"/>
+                </a:defRPr>
+              </a:lvl2pPr>
+              <a:lvl3pPr marL="914400" indent="0">
+                <a:defRPr sz="1100">
+                  <a:solidFill>
+                    <a:schemeClr val="tx1"/>
+                  </a:solidFill>
+                  <a:latin typeface="+mn-lt"/>
+                  <a:ea typeface="+mn-ea"/>
+                  <a:cs typeface="+mn-cs"/>
+                </a:defRPr>
+              </a:lvl3pPr>
+              <a:lvl4pPr marL="1371600" indent="0">
+                <a:defRPr sz="1100">
+                  <a:solidFill>
+                    <a:schemeClr val="tx1"/>
+                  </a:solidFill>
+                  <a:latin typeface="+mn-lt"/>
+                  <a:ea typeface="+mn-ea"/>
+                  <a:cs typeface="+mn-cs"/>
+                </a:defRPr>
+              </a:lvl4pPr>
+              <a:lvl5pPr marL="1828800" indent="0">
+                <a:defRPr sz="1100">
+                  <a:solidFill>
+                    <a:schemeClr val="tx1"/>
+                  </a:solidFill>
+                  <a:latin typeface="+mn-lt"/>
+                  <a:ea typeface="+mn-ea"/>
+                  <a:cs typeface="+mn-cs"/>
+                </a:defRPr>
+              </a:lvl5pPr>
+              <a:lvl6pPr marL="2286000" indent="0">
+                <a:defRPr sz="1100">
+                  <a:solidFill>
+                    <a:schemeClr val="tx1"/>
+                  </a:solidFill>
+                  <a:latin typeface="+mn-lt"/>
+                  <a:ea typeface="+mn-ea"/>
+                  <a:cs typeface="+mn-cs"/>
+                </a:defRPr>
+              </a:lvl6pPr>
+              <a:lvl7pPr marL="2743200" indent="0">
+                <a:defRPr sz="1100">
+                  <a:solidFill>
+                    <a:schemeClr val="tx1"/>
+                  </a:solidFill>
+                  <a:latin typeface="+mn-lt"/>
+                  <a:ea typeface="+mn-ea"/>
+                  <a:cs typeface="+mn-cs"/>
+                </a:defRPr>
+              </a:lvl7pPr>
+              <a:lvl8pPr marL="3200400" indent="0">
+                <a:defRPr sz="1100">
+                  <a:solidFill>
+                    <a:schemeClr val="tx1"/>
+                  </a:solidFill>
+                  <a:latin typeface="+mn-lt"/>
+                  <a:ea typeface="+mn-ea"/>
+                  <a:cs typeface="+mn-cs"/>
+                </a:defRPr>
+              </a:lvl8pPr>
+              <a:lvl9pPr marL="3657600" indent="0">
+                <a:defRPr sz="1100">
+                  <a:solidFill>
+                    <a:schemeClr val="tx1"/>
+                  </a:solidFill>
+                  <a:latin typeface="+mn-lt"/>
+                  <a:ea typeface="+mn-ea"/>
+                  <a:cs typeface="+mn-cs"/>
+                </a:defRPr>
+              </a:lvl9pPr>
+            </a:lstStyle>
+            <a:p>
+              <a:pPr algn="l">
+                <a:spcAft>
+                  <a:spcPts val="300"/>
+                </a:spcAft>
+              </a:pPr>
+              <a:r>
+                <a:rPr lang="en-US" altLang="ko-KR" sz="1000" dirty="0">
+                  <a:solidFill>
+                    <a:schemeClr val="accent1"/>
+                  </a:solidFill>
+                  <a:latin typeface="+mn-ea"/>
+                  <a:ea typeface="+mn-ea"/>
+                </a:rPr>
+                <a:t>ex) </a:t>
+              </a:r>
+              <a:r>
+                <a:rPr lang="ko-KR" altLang="en-US" sz="1000" dirty="0" err="1">
+                  <a:solidFill>
+                    <a:schemeClr val="accent1"/>
+                  </a:solidFill>
+                  <a:latin typeface="+mn-ea"/>
+                  <a:ea typeface="+mn-ea"/>
+                </a:rPr>
+                <a:t>환수사</a:t>
+              </a:r>
+              <a:r>
+                <a:rPr lang="ko-KR" altLang="en-US" sz="1000" dirty="0">
+                  <a:solidFill>
+                    <a:schemeClr val="accent1"/>
+                  </a:solidFill>
+                  <a:latin typeface="+mn-ea"/>
+                  <a:ea typeface="+mn-ea"/>
+                </a:rPr>
+                <a:t> </a:t>
+              </a:r>
+              <a:r>
+                <a:rPr lang="en-US" altLang="ko-KR" sz="1000" dirty="0">
+                  <a:solidFill>
+                    <a:schemeClr val="accent1"/>
+                  </a:solidFill>
+                  <a:latin typeface="+mn-ea"/>
+                  <a:ea typeface="+mn-ea"/>
+                </a:rPr>
+                <a:t>'</a:t>
+              </a:r>
+              <a:r>
+                <a:rPr lang="ko-KR" altLang="en-US" sz="1000" b="1" u="sng" dirty="0">
+                  <a:solidFill>
+                    <a:schemeClr val="accent1"/>
+                  </a:solidFill>
+                  <a:latin typeface="+mn-ea"/>
+                  <a:ea typeface="+mn-ea"/>
+                </a:rPr>
+                <a:t>한방 곰</a:t>
+              </a:r>
+              <a:r>
+                <a:rPr lang="en-US" altLang="ko-KR" sz="1000" dirty="0">
+                  <a:solidFill>
+                    <a:schemeClr val="accent1"/>
+                  </a:solidFill>
+                  <a:latin typeface="+mn-ea"/>
+                  <a:ea typeface="+mn-ea"/>
+                </a:rPr>
+                <a:t>' </a:t>
+              </a:r>
+              <a:r>
+                <a:rPr lang="ko-KR" altLang="en-US" sz="1000" dirty="0">
+                  <a:solidFill>
+                    <a:schemeClr val="accent1"/>
+                  </a:solidFill>
+                  <a:latin typeface="+mn-ea"/>
+                  <a:ea typeface="+mn-ea"/>
+                </a:rPr>
+                <a:t>스킬 </a:t>
+              </a:r>
+              <a:r>
+                <a:rPr lang="en-US" altLang="ko-KR" sz="1000" dirty="0">
+                  <a:solidFill>
+                    <a:schemeClr val="accent1"/>
+                  </a:solidFill>
+                  <a:latin typeface="+mn-ea"/>
+                  <a:ea typeface="+mn-ea"/>
+                </a:rPr>
+                <a:t>- </a:t>
+              </a:r>
+              <a:r>
+                <a:rPr lang="ko-KR" altLang="en-US" sz="1000" dirty="0">
+                  <a:solidFill>
+                    <a:schemeClr val="accent1"/>
+                  </a:solidFill>
+                  <a:latin typeface="+mn-ea"/>
+                  <a:ea typeface="+mn-ea"/>
+                </a:rPr>
+                <a:t>마나 </a:t>
+              </a:r>
+              <a:r>
+                <a:rPr lang="en-US" altLang="ko-KR" sz="1000" dirty="0">
+                  <a:solidFill>
+                    <a:schemeClr val="accent1"/>
+                  </a:solidFill>
+                  <a:latin typeface="+mn-ea"/>
+                  <a:ea typeface="+mn-ea"/>
+                </a:rPr>
+                <a:t>794, </a:t>
+              </a:r>
+              <a:r>
+                <a:rPr lang="ko-KR" altLang="en-US" sz="1000" dirty="0">
+                  <a:solidFill>
+                    <a:schemeClr val="accent1"/>
+                  </a:solidFill>
+                  <a:latin typeface="+mn-ea"/>
+                  <a:ea typeface="+mn-ea"/>
+                </a:rPr>
+                <a:t>환수의 기운 </a:t>
+              </a:r>
+              <a:r>
+                <a:rPr lang="en-US" altLang="ko-KR" sz="1000" dirty="0">
+                  <a:solidFill>
+                    <a:schemeClr val="accent1"/>
+                  </a:solidFill>
+                  <a:latin typeface="+mn-ea"/>
+                  <a:ea typeface="+mn-ea"/>
+                </a:rPr>
+                <a:t>1500 </a:t>
+              </a:r>
+              <a:r>
+                <a:rPr lang="ko-KR" altLang="en-US" sz="1000" dirty="0">
+                  <a:solidFill>
+                    <a:schemeClr val="accent1"/>
+                  </a:solidFill>
+                  <a:latin typeface="+mn-ea"/>
+                  <a:ea typeface="+mn-ea"/>
+                </a:rPr>
+                <a:t>소모</a:t>
+              </a:r>
+              <a:endParaRPr lang="en-US" altLang="ko-KR" sz="1000" dirty="0">
+                <a:solidFill>
+                  <a:schemeClr val="accent1"/>
+                </a:solidFill>
+                <a:latin typeface="+mn-ea"/>
+                <a:ea typeface="+mn-ea"/>
+              </a:endParaRPr>
+            </a:p>
+            <a:p>
+              <a:pPr algn="l">
+                <a:spcAft>
+                  <a:spcPts val="300"/>
+                </a:spcAft>
+              </a:pPr>
+              <a:r>
+                <a:rPr lang="en-US" altLang="ko-KR" sz="1000" b="1" dirty="0" err="1">
+                  <a:latin typeface="+mn-ea"/>
+                  <a:ea typeface="+mn-ea"/>
+                </a:rPr>
+                <a:t>cost_type</a:t>
+              </a:r>
+              <a:r>
+                <a:rPr lang="en-US" altLang="ko-KR" sz="1000" dirty="0">
+                  <a:latin typeface="+mn-ea"/>
+                  <a:ea typeface="+mn-ea"/>
+                </a:rPr>
+                <a:t> = [MANA,IDENTITY_GAUGE_1] / </a:t>
+              </a:r>
+              <a:r>
+                <a:rPr lang="en-US" altLang="ko-KR" sz="1000" b="1" dirty="0" err="1">
+                  <a:latin typeface="+mn-ea"/>
+                  <a:ea typeface="+mn-ea"/>
+                </a:rPr>
+                <a:t>cost_value</a:t>
+              </a:r>
+              <a:r>
+                <a:rPr lang="en-US" altLang="ko-KR" sz="1000" dirty="0">
+                  <a:latin typeface="+mn-ea"/>
+                  <a:ea typeface="+mn-ea"/>
+                </a:rPr>
+                <a:t> = [794,1500]</a:t>
+              </a:r>
+            </a:p>
+            <a:p>
+              <a:pPr algn="l">
+                <a:spcAft>
+                  <a:spcPts val="300"/>
+                </a:spcAft>
+              </a:pPr>
+              <a:r>
+                <a:rPr lang="en-US" altLang="ko-KR" sz="1000" baseline="0" dirty="0">
+                  <a:latin typeface="+mn-ea"/>
+                  <a:ea typeface="+mn-ea"/>
+                </a:rPr>
+                <a:t>-&gt; </a:t>
+              </a:r>
+              <a:r>
+                <a:rPr lang="en-US" altLang="ko-KR" sz="1000" dirty="0">
+                  <a:latin typeface="+mn-ea"/>
+                  <a:ea typeface="+mn-ea"/>
+                </a:rPr>
+                <a:t>{ 'MANA' : 794, '</a:t>
+              </a:r>
+              <a:r>
+                <a:rPr lang="en-US" altLang="ko-KR" sz="1000" dirty="0">
+                  <a:solidFill>
+                    <a:schemeClr val="tx1"/>
+                  </a:solidFill>
+                  <a:effectLst/>
+                  <a:latin typeface="+mn-ea"/>
+                  <a:ea typeface="+mn-ea"/>
+                  <a:cs typeface="+mn-cs"/>
+                </a:rPr>
+                <a:t>IDENTITY_GAUGE_1</a:t>
+              </a:r>
+              <a:r>
+                <a:rPr lang="en-US" altLang="ko-KR" sz="1000" dirty="0">
+                  <a:latin typeface="+mn-ea"/>
+                  <a:ea typeface="+mn-ea"/>
+                </a:rPr>
+                <a:t>' : 1500 }</a:t>
+              </a:r>
+              <a:endParaRPr lang="ko-KR" altLang="en-US" sz="1000" dirty="0">
+                <a:latin typeface="+mn-ea"/>
+                <a:ea typeface="+mn-ea"/>
+              </a:endParaRPr>
+            </a:p>
+          </p:txBody>
+        </p:sp>
+        <p:sp>
+          <p:nvSpPr>
+            <p:cNvPr id="6" name="TextBox 2">
+              <a:extLst>
+                <a:ext uri="{FF2B5EF4-FFF2-40B4-BE49-F238E27FC236}">
+                  <a16:creationId xmlns:a16="http://schemas.microsoft.com/office/drawing/2014/main" id="{4C5EBA7C-199D-71CF-FE3B-4C44FE9BC459}"/>
+                </a:ext>
+              </a:extLst>
+            </p:cNvPr>
+            <p:cNvSpPr txBox="1"/>
+            <p:nvPr/>
+          </p:nvSpPr>
+          <p:spPr>
+            <a:xfrm>
+              <a:off x="2855578" y="2157028"/>
+              <a:ext cx="3963202" cy="305121"/>
+            </a:xfrm>
+            <a:prstGeom prst="rect">
+              <a:avLst/>
+            </a:prstGeom>
+            <a:solidFill>
+              <a:srgbClr val="FFFFD5"/>
+            </a:solidFill>
+            <a:ln w="12700">
+              <a:solidFill>
+                <a:schemeClr val="tx1"/>
+              </a:solidFill>
+            </a:ln>
+          </p:spPr>
+          <p:style>
+            <a:lnRef idx="0">
+              <a:scrgbClr r="0" g="0" b="0"/>
+            </a:lnRef>
+            <a:fillRef idx="0">
+              <a:scrgbClr r="0" g="0" b="0"/>
+            </a:fillRef>
+            <a:effectRef idx="0">
+              <a:scrgbClr r="0" g="0" b="0"/>
+            </a:effectRef>
+            <a:fontRef idx="minor">
+              <a:schemeClr val="tx1"/>
+            </a:fontRef>
+          </p:style>
+          <p:txBody>
+            <a:bodyPr wrap="square" rtlCol="0" anchor="ctr">
+              <a:noAutofit/>
+            </a:bodyPr>
+            <a:lstStyle>
+              <a:defPPr>
+                <a:defRPr lang="ko-KR"/>
+              </a:defPPr>
+              <a:lvl1pPr indent="0" algn="ctr">
+                <a:defRPr sz="1000" b="1">
+                  <a:latin typeface="+mn-ea"/>
+                </a:defRPr>
+              </a:lvl1pPr>
+              <a:lvl2pPr indent="0">
+                <a:defRPr sz="1100"/>
+              </a:lvl2pPr>
+              <a:lvl3pPr indent="0">
+                <a:defRPr sz="1100"/>
+              </a:lvl3pPr>
+              <a:lvl4pPr indent="0">
+                <a:defRPr sz="1100"/>
+              </a:lvl4pPr>
+              <a:lvl5pPr indent="0">
+                <a:defRPr sz="1100"/>
+              </a:lvl5pPr>
+              <a:lvl6pPr indent="0">
+                <a:defRPr sz="1100"/>
+              </a:lvl6pPr>
+              <a:lvl7pPr indent="0">
+                <a:defRPr sz="1100"/>
+              </a:lvl7pPr>
+              <a:lvl8pPr indent="0">
+                <a:defRPr sz="1100"/>
+              </a:lvl8pPr>
+              <a:lvl9pPr indent="0">
+                <a:defRPr sz="1100"/>
+              </a:lvl9pPr>
+            </a:lstStyle>
+            <a:p>
+              <a:r>
+                <a:rPr lang="en-US" altLang="ko-KR" dirty="0" err="1"/>
+                <a:t>cost_type</a:t>
+              </a:r>
+              <a:r>
+                <a:rPr lang="ko-KR" altLang="en-US" b="0" dirty="0"/>
+                <a:t>과 </a:t>
+              </a:r>
+              <a:r>
+                <a:rPr lang="en-US" altLang="ko-KR" dirty="0" err="1"/>
+                <a:t>cost_value</a:t>
+              </a:r>
+              <a:r>
+                <a:rPr lang="ko-KR" altLang="en-US" b="0" dirty="0"/>
+                <a:t>는 </a:t>
+              </a:r>
+              <a:r>
+                <a:rPr lang="ko-KR" altLang="en-US" dirty="0"/>
+                <a:t>키</a:t>
+              </a:r>
+              <a:r>
+                <a:rPr lang="en-US" altLang="ko-KR" dirty="0"/>
+                <a:t>-</a:t>
+              </a:r>
+              <a:r>
+                <a:rPr lang="ko-KR" altLang="en-US" dirty="0" err="1"/>
+                <a:t>밸류</a:t>
+              </a:r>
+              <a:r>
+                <a:rPr lang="ko-KR" altLang="en-US" b="0" dirty="0"/>
+                <a:t> 형태로 추출해서 사용 </a:t>
+              </a:r>
+              <a:endParaRPr lang="en-US" altLang="ko-KR" b="0" dirty="0"/>
+            </a:p>
+          </p:txBody>
+        </p:sp>
+        <p:sp>
+          <p:nvSpPr>
+            <p:cNvPr id="7" name="TextBox 4">
+              <a:extLst>
+                <a:ext uri="{FF2B5EF4-FFF2-40B4-BE49-F238E27FC236}">
+                  <a16:creationId xmlns:a16="http://schemas.microsoft.com/office/drawing/2014/main" id="{0F1CFCAA-2C68-AEC1-295B-DE6E5076ABE5}"/>
+                </a:ext>
+              </a:extLst>
+            </p:cNvPr>
+            <p:cNvSpPr txBox="1"/>
+            <p:nvPr/>
+          </p:nvSpPr>
+          <p:spPr>
+            <a:xfrm>
+              <a:off x="2177731" y="2157028"/>
+              <a:ext cx="677847" cy="305121"/>
+            </a:xfrm>
+            <a:prstGeom prst="rect">
+              <a:avLst/>
+            </a:prstGeom>
+            <a:solidFill>
+              <a:schemeClr val="bg1">
+                <a:lumMod val="50000"/>
+              </a:schemeClr>
+            </a:solidFill>
+            <a:ln w="12700">
+              <a:solidFill>
+                <a:schemeClr val="tx1"/>
+              </a:solidFill>
+            </a:ln>
+          </p:spPr>
+          <p:style>
+            <a:lnRef idx="0">
+              <a:scrgbClr r="0" g="0" b="0"/>
+            </a:lnRef>
+            <a:fillRef idx="0">
+              <a:scrgbClr r="0" g="0" b="0"/>
+            </a:fillRef>
+            <a:effectRef idx="0">
+              <a:scrgbClr r="0" g="0" b="0"/>
+            </a:effectRef>
+            <a:fontRef idx="minor">
+              <a:schemeClr val="tx1"/>
+            </a:fontRef>
+          </p:style>
+          <p:txBody>
+            <a:bodyPr wrap="square" rtlCol="0" anchor="ctr">
+              <a:noAutofit/>
+            </a:bodyPr>
+            <a:lstStyle>
+              <a:lvl1pPr marL="0" indent="0">
+                <a:defRPr sz="1100">
+                  <a:solidFill>
+                    <a:schemeClr val="tx1"/>
+                  </a:solidFill>
+                  <a:latin typeface="+mn-lt"/>
+                  <a:ea typeface="+mn-ea"/>
+                  <a:cs typeface="+mn-cs"/>
+                </a:defRPr>
+              </a:lvl1pPr>
+              <a:lvl2pPr marL="457200" indent="0">
+                <a:defRPr sz="1100">
+                  <a:solidFill>
+                    <a:schemeClr val="tx1"/>
+                  </a:solidFill>
+                  <a:latin typeface="+mn-lt"/>
+                  <a:ea typeface="+mn-ea"/>
+                  <a:cs typeface="+mn-cs"/>
+                </a:defRPr>
+              </a:lvl2pPr>
+              <a:lvl3pPr marL="914400" indent="0">
+                <a:defRPr sz="1100">
+                  <a:solidFill>
+                    <a:schemeClr val="tx1"/>
+                  </a:solidFill>
+                  <a:latin typeface="+mn-lt"/>
+                  <a:ea typeface="+mn-ea"/>
+                  <a:cs typeface="+mn-cs"/>
+                </a:defRPr>
+              </a:lvl3pPr>
+              <a:lvl4pPr marL="1371600" indent="0">
+                <a:defRPr sz="1100">
+                  <a:solidFill>
+                    <a:schemeClr val="tx1"/>
+                  </a:solidFill>
+                  <a:latin typeface="+mn-lt"/>
+                  <a:ea typeface="+mn-ea"/>
+                  <a:cs typeface="+mn-cs"/>
+                </a:defRPr>
+              </a:lvl4pPr>
+              <a:lvl5pPr marL="1828800" indent="0">
+                <a:defRPr sz="1100">
+                  <a:solidFill>
+                    <a:schemeClr val="tx1"/>
+                  </a:solidFill>
+                  <a:latin typeface="+mn-lt"/>
+                  <a:ea typeface="+mn-ea"/>
+                  <a:cs typeface="+mn-cs"/>
+                </a:defRPr>
+              </a:lvl5pPr>
+              <a:lvl6pPr marL="2286000" indent="0">
+                <a:defRPr sz="1100">
+                  <a:solidFill>
+                    <a:schemeClr val="tx1"/>
+                  </a:solidFill>
+                  <a:latin typeface="+mn-lt"/>
+                  <a:ea typeface="+mn-ea"/>
+                  <a:cs typeface="+mn-cs"/>
+                </a:defRPr>
+              </a:lvl6pPr>
+              <a:lvl7pPr marL="2743200" indent="0">
+                <a:defRPr sz="1100">
+                  <a:solidFill>
+                    <a:schemeClr val="tx1"/>
+                  </a:solidFill>
+                  <a:latin typeface="+mn-lt"/>
+                  <a:ea typeface="+mn-ea"/>
+                  <a:cs typeface="+mn-cs"/>
+                </a:defRPr>
+              </a:lvl7pPr>
+              <a:lvl8pPr marL="3200400" indent="0">
+                <a:defRPr sz="1100">
+                  <a:solidFill>
+                    <a:schemeClr val="tx1"/>
+                  </a:solidFill>
+                  <a:latin typeface="+mn-lt"/>
+                  <a:ea typeface="+mn-ea"/>
+                  <a:cs typeface="+mn-cs"/>
+                </a:defRPr>
+              </a:lvl8pPr>
+              <a:lvl9pPr marL="3657600" indent="0">
+                <a:defRPr sz="1100">
+                  <a:solidFill>
+                    <a:schemeClr val="tx1"/>
+                  </a:solidFill>
+                  <a:latin typeface="+mn-lt"/>
+                  <a:ea typeface="+mn-ea"/>
+                  <a:cs typeface="+mn-cs"/>
+                </a:defRPr>
+              </a:lvl9pPr>
+            </a:lstStyle>
+            <a:p>
+              <a:pPr algn="ctr"/>
+              <a:r>
+                <a:rPr lang="ko-KR" altLang="en-US" sz="1000" b="1" dirty="0">
+                  <a:solidFill>
+                    <a:schemeClr val="bg1"/>
+                  </a:solidFill>
+                  <a:latin typeface="+mn-ea"/>
+                  <a:ea typeface="+mn-ea"/>
+                </a:rPr>
+                <a:t>참고 </a:t>
+              </a:r>
+              <a:r>
+                <a:rPr lang="en-US" altLang="ko-KR" sz="1000" b="1" dirty="0">
+                  <a:solidFill>
+                    <a:schemeClr val="bg1"/>
+                  </a:solidFill>
+                  <a:latin typeface="+mn-ea"/>
+                  <a:ea typeface="+mn-ea"/>
+                </a:rPr>
+                <a:t>1</a:t>
+              </a:r>
+              <a:endParaRPr lang="en-US" altLang="ko-KR" sz="1000" dirty="0">
+                <a:solidFill>
+                  <a:schemeClr val="bg1"/>
+                </a:solidFill>
+                <a:latin typeface="+mn-ea"/>
+                <a:ea typeface="+mn-ea"/>
+              </a:endParaRPr>
+            </a:p>
+          </p:txBody>
+        </p:sp>
+        <p:sp>
+          <p:nvSpPr>
+            <p:cNvPr id="8" name="TextBox 5">
+              <a:extLst>
+                <a:ext uri="{FF2B5EF4-FFF2-40B4-BE49-F238E27FC236}">
+                  <a16:creationId xmlns:a16="http://schemas.microsoft.com/office/drawing/2014/main" id="{AF980828-B39F-ADA7-344F-94E575A639EE}"/>
+                </a:ext>
+              </a:extLst>
+            </p:cNvPr>
+            <p:cNvSpPr txBox="1"/>
+            <p:nvPr/>
+          </p:nvSpPr>
+          <p:spPr>
+            <a:xfrm>
+              <a:off x="2177728" y="3307080"/>
+              <a:ext cx="4641047" cy="846000"/>
+            </a:xfrm>
+            <a:prstGeom prst="rect">
+              <a:avLst/>
+            </a:prstGeom>
+            <a:solidFill>
+              <a:schemeClr val="bg1"/>
+            </a:solidFill>
+            <a:ln w="12700">
+              <a:solidFill>
+                <a:schemeClr val="tx1"/>
+              </a:solidFill>
+            </a:ln>
+          </p:spPr>
+          <p:style>
+            <a:lnRef idx="0">
+              <a:scrgbClr r="0" g="0" b="0"/>
+            </a:lnRef>
+            <a:fillRef idx="0">
+              <a:scrgbClr r="0" g="0" b="0"/>
+            </a:fillRef>
+            <a:effectRef idx="0">
+              <a:scrgbClr r="0" g="0" b="0"/>
+            </a:effectRef>
+            <a:fontRef idx="minor">
+              <a:schemeClr val="tx1"/>
+            </a:fontRef>
+          </p:style>
+          <p:txBody>
+            <a:bodyPr wrap="square" lIns="216000" rtlCol="0" anchor="ctr">
+              <a:noAutofit/>
+            </a:bodyPr>
+            <a:lstStyle>
+              <a:lvl1pPr marL="0" indent="0">
+                <a:defRPr sz="1100">
+                  <a:solidFill>
+                    <a:schemeClr val="tx1"/>
+                  </a:solidFill>
+                  <a:latin typeface="+mn-lt"/>
+                  <a:ea typeface="+mn-ea"/>
+                  <a:cs typeface="+mn-cs"/>
+                </a:defRPr>
+              </a:lvl1pPr>
+              <a:lvl2pPr marL="457200" indent="0">
+                <a:defRPr sz="1100">
+                  <a:solidFill>
+                    <a:schemeClr val="tx1"/>
+                  </a:solidFill>
+                  <a:latin typeface="+mn-lt"/>
+                  <a:ea typeface="+mn-ea"/>
+                  <a:cs typeface="+mn-cs"/>
+                </a:defRPr>
+              </a:lvl2pPr>
+              <a:lvl3pPr marL="914400" indent="0">
+                <a:defRPr sz="1100">
+                  <a:solidFill>
+                    <a:schemeClr val="tx1"/>
+                  </a:solidFill>
+                  <a:latin typeface="+mn-lt"/>
+                  <a:ea typeface="+mn-ea"/>
+                  <a:cs typeface="+mn-cs"/>
+                </a:defRPr>
+              </a:lvl3pPr>
+              <a:lvl4pPr marL="1371600" indent="0">
+                <a:defRPr sz="1100">
+                  <a:solidFill>
+                    <a:schemeClr val="tx1"/>
+                  </a:solidFill>
+                  <a:latin typeface="+mn-lt"/>
+                  <a:ea typeface="+mn-ea"/>
+                  <a:cs typeface="+mn-cs"/>
+                </a:defRPr>
+              </a:lvl4pPr>
+              <a:lvl5pPr marL="1828800" indent="0">
+                <a:defRPr sz="1100">
+                  <a:solidFill>
+                    <a:schemeClr val="tx1"/>
+                  </a:solidFill>
+                  <a:latin typeface="+mn-lt"/>
+                  <a:ea typeface="+mn-ea"/>
+                  <a:cs typeface="+mn-cs"/>
+                </a:defRPr>
+              </a:lvl5pPr>
+              <a:lvl6pPr marL="2286000" indent="0">
+                <a:defRPr sz="1100">
+                  <a:solidFill>
+                    <a:schemeClr val="tx1"/>
+                  </a:solidFill>
+                  <a:latin typeface="+mn-lt"/>
+                  <a:ea typeface="+mn-ea"/>
+                  <a:cs typeface="+mn-cs"/>
+                </a:defRPr>
+              </a:lvl6pPr>
+              <a:lvl7pPr marL="2743200" indent="0">
+                <a:defRPr sz="1100">
+                  <a:solidFill>
+                    <a:schemeClr val="tx1"/>
+                  </a:solidFill>
+                  <a:latin typeface="+mn-lt"/>
+                  <a:ea typeface="+mn-ea"/>
+                  <a:cs typeface="+mn-cs"/>
+                </a:defRPr>
+              </a:lvl7pPr>
+              <a:lvl8pPr marL="3200400" indent="0">
+                <a:defRPr sz="1100">
+                  <a:solidFill>
+                    <a:schemeClr val="tx1"/>
+                  </a:solidFill>
+                  <a:latin typeface="+mn-lt"/>
+                  <a:ea typeface="+mn-ea"/>
+                  <a:cs typeface="+mn-cs"/>
+                </a:defRPr>
+              </a:lvl8pPr>
+              <a:lvl9pPr marL="3657600" indent="0">
+                <a:defRPr sz="1100">
+                  <a:solidFill>
+                    <a:schemeClr val="tx1"/>
+                  </a:solidFill>
+                  <a:latin typeface="+mn-lt"/>
+                  <a:ea typeface="+mn-ea"/>
+                  <a:cs typeface="+mn-cs"/>
+                </a:defRPr>
+              </a:lvl9pPr>
+            </a:lstStyle>
+            <a:p>
+              <a:pPr algn="l">
+                <a:spcAft>
+                  <a:spcPts val="300"/>
+                </a:spcAft>
+              </a:pPr>
+              <a:r>
+                <a:rPr lang="en-US" altLang="ko-KR" sz="1000" dirty="0">
+                  <a:solidFill>
+                    <a:schemeClr val="accent1"/>
+                  </a:solidFill>
+                  <a:latin typeface="+mn-ea"/>
+                  <a:ea typeface="+mn-ea"/>
+                </a:rPr>
+                <a:t>ex) </a:t>
+              </a:r>
+              <a:r>
+                <a:rPr lang="ko-KR" altLang="en-US" sz="1000" dirty="0" err="1">
+                  <a:solidFill>
+                    <a:schemeClr val="accent1"/>
+                  </a:solidFill>
+                  <a:latin typeface="+mn-ea"/>
+                  <a:ea typeface="+mn-ea"/>
+                </a:rPr>
+                <a:t>브레이커</a:t>
+              </a:r>
+              <a:r>
+                <a:rPr lang="ko-KR" altLang="en-US" sz="1000" dirty="0">
+                  <a:solidFill>
+                    <a:schemeClr val="accent1"/>
+                  </a:solidFill>
+                  <a:latin typeface="+mn-ea"/>
+                  <a:ea typeface="+mn-ea"/>
+                </a:rPr>
+                <a:t> </a:t>
+              </a:r>
+              <a:r>
+                <a:rPr lang="en-US" altLang="ko-KR" sz="1000" dirty="0">
+                  <a:solidFill>
+                    <a:schemeClr val="accent1"/>
+                  </a:solidFill>
+                  <a:latin typeface="+mn-ea"/>
+                  <a:ea typeface="+mn-ea"/>
+                </a:rPr>
+                <a:t>'</a:t>
+              </a:r>
+              <a:r>
+                <a:rPr lang="ko-KR" altLang="en-US" sz="1000" b="1" u="sng" dirty="0" err="1">
+                  <a:solidFill>
+                    <a:schemeClr val="accent1"/>
+                  </a:solidFill>
+                  <a:latin typeface="+mn-ea"/>
+                  <a:ea typeface="+mn-ea"/>
+                </a:rPr>
+                <a:t>파천섬광</a:t>
+              </a:r>
+              <a:r>
+                <a:rPr lang="en-US" altLang="ko-KR" sz="1000" dirty="0">
+                  <a:solidFill>
+                    <a:schemeClr val="accent1"/>
+                  </a:solidFill>
+                  <a:latin typeface="+mn-ea"/>
+                  <a:ea typeface="+mn-ea"/>
+                </a:rPr>
+                <a:t>' </a:t>
+              </a:r>
+              <a:r>
+                <a:rPr lang="ko-KR" altLang="en-US" sz="1000" dirty="0">
+                  <a:solidFill>
+                    <a:schemeClr val="accent1"/>
+                  </a:solidFill>
+                  <a:latin typeface="+mn-ea"/>
+                  <a:ea typeface="+mn-ea"/>
+                </a:rPr>
+                <a:t>스킬 </a:t>
+              </a:r>
+              <a:r>
+                <a:rPr lang="en-US" altLang="ko-KR" sz="1000" dirty="0">
+                  <a:solidFill>
+                    <a:schemeClr val="accent1"/>
+                  </a:solidFill>
+                  <a:latin typeface="+mn-ea"/>
+                  <a:ea typeface="+mn-ea"/>
+                </a:rPr>
+                <a:t>- </a:t>
+              </a:r>
+              <a:r>
+                <a:rPr lang="ko-KR" altLang="en-US" sz="1000" dirty="0">
+                  <a:solidFill>
+                    <a:schemeClr val="accent1"/>
+                  </a:solidFill>
+                  <a:latin typeface="+mn-ea"/>
+                  <a:ea typeface="+mn-ea"/>
+                </a:rPr>
+                <a:t>충격 게이지 </a:t>
+              </a:r>
+              <a:r>
+                <a:rPr lang="en-US" altLang="ko-KR" sz="1000" dirty="0">
+                  <a:solidFill>
+                    <a:schemeClr val="accent1"/>
+                  </a:solidFill>
+                  <a:latin typeface="+mn-ea"/>
+                  <a:ea typeface="+mn-ea"/>
+                </a:rPr>
+                <a:t>50 </a:t>
+              </a:r>
+              <a:r>
+                <a:rPr lang="ko-KR" altLang="en-US" sz="1000" dirty="0">
+                  <a:solidFill>
+                    <a:schemeClr val="accent1"/>
+                  </a:solidFill>
+                  <a:latin typeface="+mn-ea"/>
+                  <a:ea typeface="+mn-ea"/>
+                </a:rPr>
+                <a:t>소모</a:t>
+              </a:r>
+              <a:endParaRPr lang="en-US" altLang="ko-KR" sz="1000" dirty="0">
+                <a:solidFill>
+                  <a:schemeClr val="accent1"/>
+                </a:solidFill>
+                <a:latin typeface="+mn-ea"/>
+                <a:ea typeface="+mn-ea"/>
+              </a:endParaRPr>
+            </a:p>
+            <a:p>
+              <a:pPr algn="l">
+                <a:spcAft>
+                  <a:spcPts val="300"/>
+                </a:spcAft>
+              </a:pPr>
+              <a:r>
+                <a:rPr lang="en-US" altLang="ko-KR" sz="1000" b="1" dirty="0" err="1">
+                  <a:latin typeface="+mn-ea"/>
+                  <a:ea typeface="+mn-ea"/>
+                </a:rPr>
+                <a:t>cost_type</a:t>
+              </a:r>
+              <a:r>
+                <a:rPr lang="en-US" altLang="ko-KR" sz="1000" dirty="0">
+                  <a:latin typeface="+mn-ea"/>
+                  <a:ea typeface="+mn-ea"/>
+                </a:rPr>
+                <a:t> = </a:t>
+              </a:r>
+              <a:r>
+                <a:rPr lang="en-US" altLang="ko-KR" sz="1000" dirty="0">
+                  <a:solidFill>
+                    <a:schemeClr val="tx1"/>
+                  </a:solidFill>
+                  <a:effectLst/>
+                  <a:latin typeface="+mn-ea"/>
+                  <a:ea typeface="+mn-ea"/>
+                  <a:cs typeface="+mn-cs"/>
+                </a:rPr>
+                <a:t>IDENTITY_GAUGE_3 / </a:t>
+              </a:r>
+              <a:r>
+                <a:rPr lang="en-US" altLang="ko-KR" sz="1000" b="1" dirty="0" err="1">
+                  <a:latin typeface="+mn-ea"/>
+                  <a:ea typeface="+mn-ea"/>
+                </a:rPr>
+                <a:t>cost_value</a:t>
+              </a:r>
+              <a:r>
+                <a:rPr lang="en-US" altLang="ko-KR" sz="1000" dirty="0">
+                  <a:latin typeface="+mn-ea"/>
+                  <a:ea typeface="+mn-ea"/>
+                </a:rPr>
+                <a:t> = 50</a:t>
+              </a:r>
+            </a:p>
+            <a:p>
+              <a:pPr algn="l">
+                <a:spcAft>
+                  <a:spcPts val="300"/>
+                </a:spcAft>
+              </a:pPr>
+              <a:r>
+                <a:rPr lang="en-US" altLang="ko-KR" sz="1000" baseline="0" dirty="0">
+                  <a:latin typeface="+mn-ea"/>
+                  <a:ea typeface="+mn-ea"/>
+                </a:rPr>
+                <a:t>-&gt; </a:t>
+              </a:r>
+              <a:r>
+                <a:rPr lang="en-US" altLang="ko-KR" sz="1000" dirty="0">
+                  <a:latin typeface="+mn-ea"/>
+                  <a:ea typeface="+mn-ea"/>
+                </a:rPr>
+                <a:t>{ '</a:t>
+              </a:r>
+              <a:r>
+                <a:rPr lang="en-US" altLang="ko-KR" sz="1000" dirty="0">
+                  <a:solidFill>
+                    <a:schemeClr val="tx1"/>
+                  </a:solidFill>
+                  <a:effectLst/>
+                  <a:latin typeface="+mn-ea"/>
+                  <a:ea typeface="+mn-ea"/>
+                  <a:cs typeface="+mn-cs"/>
+                </a:rPr>
+                <a:t>IDENTITY_GAUGE_3</a:t>
+              </a:r>
+              <a:r>
+                <a:rPr lang="en-US" altLang="ko-KR" sz="1000" dirty="0">
+                  <a:latin typeface="+mn-ea"/>
+                  <a:ea typeface="+mn-ea"/>
+                </a:rPr>
+                <a:t>' : 50}</a:t>
+              </a:r>
+              <a:endParaRPr lang="ko-KR" altLang="en-US" sz="1000" dirty="0">
+                <a:latin typeface="+mn-ea"/>
+                <a:ea typeface="+mn-ea"/>
+              </a:endParaRPr>
+            </a:p>
+          </p:txBody>
+        </p:sp>
+      </p:grpSp>
+    </p:spTree>
+    <p:extLst>
+      <p:ext uri="{BB962C8B-B14F-4D97-AF65-F5344CB8AC3E}">
+        <p14:creationId xmlns:p14="http://schemas.microsoft.com/office/powerpoint/2010/main" val="2645937375"/>
+      </p:ext>
+    </p:extLst>
+  </p:cSld>
+  <p:clrMapOvr>
+    <a:masterClrMapping/>
+  </p:clrMapOvr>
+</p:sld>
+</file>
+
 <file path=ppt/theme/theme1.xml><?xml version="1.0" encoding="utf-8"?>
 <a:theme xmlns:a="http://schemas.openxmlformats.org/drawingml/2006/main" name="Office 테마">
   <a:themeElements>

</xml_diff>